<commit_message>
restructuration projet pour fit struture cours
</commit_message>
<xml_diff>
--- a/doc/Rapport_Devoir3.pptx
+++ b/doc/Rapport_Devoir3.pptx
@@ -915,7 +915,7 @@
           <a:p>
             <a:fld id="{536D1BE0-9163-4941-8556-7FE0B29195A4}" type="datetimeFigureOut">
               <a:rPr lang="en-GB" smtClean="0"/>
-              <a:t>19/03/2025</a:t>
+              <a:t>21/03/2025</a:t>
             </a:fld>
             <a:endParaRPr lang="en-GB"/>
           </a:p>
@@ -1332,7 +1332,7 @@
           <a:p>
             <a:fld id="{CEFDEF93-0E3A-4A89-BC16-F38BAE82060D}" type="datetimeFigureOut">
               <a:rPr lang="en-GB" smtClean="0"/>
-              <a:t>19/03/2025</a:t>
+              <a:t>21/03/2025</a:t>
             </a:fld>
             <a:endParaRPr lang="en-GB"/>
           </a:p>
@@ -1532,7 +1532,7 @@
           <a:p>
             <a:fld id="{CEFDEF93-0E3A-4A89-BC16-F38BAE82060D}" type="datetimeFigureOut">
               <a:rPr lang="en-GB" smtClean="0"/>
-              <a:t>19/03/2025</a:t>
+              <a:t>21/03/2025</a:t>
             </a:fld>
             <a:endParaRPr lang="en-GB"/>
           </a:p>
@@ -1742,7 +1742,7 @@
           <a:p>
             <a:fld id="{CEFDEF93-0E3A-4A89-BC16-F38BAE82060D}" type="datetimeFigureOut">
               <a:rPr lang="en-GB" smtClean="0"/>
-              <a:t>19/03/2025</a:t>
+              <a:t>21/03/2025</a:t>
             </a:fld>
             <a:endParaRPr lang="en-GB"/>
           </a:p>
@@ -1942,7 +1942,7 @@
           <a:p>
             <a:fld id="{CEFDEF93-0E3A-4A89-BC16-F38BAE82060D}" type="datetimeFigureOut">
               <a:rPr lang="en-GB" smtClean="0"/>
-              <a:t>19/03/2025</a:t>
+              <a:t>21/03/2025</a:t>
             </a:fld>
             <a:endParaRPr lang="en-GB"/>
           </a:p>
@@ -2218,7 +2218,7 @@
           <a:p>
             <a:fld id="{CEFDEF93-0E3A-4A89-BC16-F38BAE82060D}" type="datetimeFigureOut">
               <a:rPr lang="en-GB" smtClean="0"/>
-              <a:t>19/03/2025</a:t>
+              <a:t>21/03/2025</a:t>
             </a:fld>
             <a:endParaRPr lang="en-GB"/>
           </a:p>
@@ -2486,7 +2486,7 @@
           <a:p>
             <a:fld id="{CEFDEF93-0E3A-4A89-BC16-F38BAE82060D}" type="datetimeFigureOut">
               <a:rPr lang="en-GB" smtClean="0"/>
-              <a:t>19/03/2025</a:t>
+              <a:t>21/03/2025</a:t>
             </a:fld>
             <a:endParaRPr lang="en-GB"/>
           </a:p>
@@ -2901,7 +2901,7 @@
           <a:p>
             <a:fld id="{CEFDEF93-0E3A-4A89-BC16-F38BAE82060D}" type="datetimeFigureOut">
               <a:rPr lang="en-GB" smtClean="0"/>
-              <a:t>19/03/2025</a:t>
+              <a:t>21/03/2025</a:t>
             </a:fld>
             <a:endParaRPr lang="en-GB"/>
           </a:p>
@@ -3043,7 +3043,7 @@
           <a:p>
             <a:fld id="{CEFDEF93-0E3A-4A89-BC16-F38BAE82060D}" type="datetimeFigureOut">
               <a:rPr lang="en-GB" smtClean="0"/>
-              <a:t>19/03/2025</a:t>
+              <a:t>21/03/2025</a:t>
             </a:fld>
             <a:endParaRPr lang="en-GB"/>
           </a:p>
@@ -3156,7 +3156,7 @@
           <a:p>
             <a:fld id="{CEFDEF93-0E3A-4A89-BC16-F38BAE82060D}" type="datetimeFigureOut">
               <a:rPr lang="en-GB" smtClean="0"/>
-              <a:t>19/03/2025</a:t>
+              <a:t>21/03/2025</a:t>
             </a:fld>
             <a:endParaRPr lang="en-GB"/>
           </a:p>
@@ -3469,7 +3469,7 @@
           <a:p>
             <a:fld id="{CEFDEF93-0E3A-4A89-BC16-F38BAE82060D}" type="datetimeFigureOut">
               <a:rPr lang="en-GB" smtClean="0"/>
-              <a:t>19/03/2025</a:t>
+              <a:t>21/03/2025</a:t>
             </a:fld>
             <a:endParaRPr lang="en-GB"/>
           </a:p>
@@ -3758,7 +3758,7 @@
           <a:p>
             <a:fld id="{CEFDEF93-0E3A-4A89-BC16-F38BAE82060D}" type="datetimeFigureOut">
               <a:rPr lang="en-GB" smtClean="0"/>
-              <a:t>19/03/2025</a:t>
+              <a:t>21/03/2025</a:t>
             </a:fld>
             <a:endParaRPr lang="en-GB"/>
           </a:p>
@@ -4001,7 +4001,7 @@
           <a:p>
             <a:fld id="{CEFDEF93-0E3A-4A89-BC16-F38BAE82060D}" type="datetimeFigureOut">
               <a:rPr lang="en-GB" smtClean="0"/>
-              <a:t>19/03/2025</a:t>
+              <a:t>21/03/2025</a:t>
             </a:fld>
             <a:endParaRPr lang="en-GB"/>
           </a:p>
@@ -6002,8 +6002,8 @@
           </a:prstGeom>
         </p:spPr>
       </p:pic>
-      <mc:AlternateContent xmlns:mc="http://schemas.openxmlformats.org/markup-compatibility/2006">
-        <mc:Choice xmlns:a14="http://schemas.microsoft.com/office/drawing/2010/main" Requires="a14">
+      <mc:AlternateContent xmlns:mc="http://schemas.openxmlformats.org/markup-compatibility/2006" xmlns:a14="http://schemas.microsoft.com/office/drawing/2010/main">
+        <mc:Choice Requires="a14">
           <p:sp>
             <p:nvSpPr>
               <p:cNvPr id="28" name="TextBox 27">
@@ -6114,7 +6114,7 @@
             </p:txBody>
           </p:sp>
         </mc:Choice>
-        <mc:Fallback>
+        <mc:Fallback xmlns="">
           <p:sp>
             <p:nvSpPr>
               <p:cNvPr id="28" name="TextBox 27">
@@ -6527,8 +6527,8 @@
           </a:p>
         </p:txBody>
       </p:sp>
-      <mc:AlternateContent xmlns:mc="http://schemas.openxmlformats.org/markup-compatibility/2006">
-        <mc:Choice xmlns:a14="http://schemas.microsoft.com/office/drawing/2010/main" Requires="a14">
+      <mc:AlternateContent xmlns:mc="http://schemas.openxmlformats.org/markup-compatibility/2006" xmlns:a14="http://schemas.microsoft.com/office/drawing/2010/main">
+        <mc:Choice Requires="a14">
           <p:sp>
             <p:nvSpPr>
               <p:cNvPr id="6" name="TextBox 5">
@@ -6951,7 +6951,7 @@
             </p:txBody>
           </p:sp>
         </mc:Choice>
-        <mc:Fallback>
+        <mc:Fallback xmlns="">
           <p:sp>
             <p:nvSpPr>
               <p:cNvPr id="6" name="TextBox 5">
@@ -8773,8 +8773,8 @@
           </a:fontRef>
         </p:style>
       </p:cxnSp>
-      <mc:AlternateContent xmlns:mc="http://schemas.openxmlformats.org/markup-compatibility/2006">
-        <mc:Choice xmlns:a14="http://schemas.microsoft.com/office/drawing/2010/main" Requires="a14">
+      <mc:AlternateContent xmlns:mc="http://schemas.openxmlformats.org/markup-compatibility/2006" xmlns:a14="http://schemas.microsoft.com/office/drawing/2010/main">
+        <mc:Choice Requires="a14">
           <p:sp>
             <p:nvSpPr>
               <p:cNvPr id="8" name="TextBox 7">
@@ -8857,7 +8857,7 @@
             </p:txBody>
           </p:sp>
         </mc:Choice>
-        <mc:Fallback>
+        <mc:Fallback xmlns="">
           <p:sp>
             <p:nvSpPr>
               <p:cNvPr id="8" name="TextBox 7">

</xml_diff>

<commit_message>
debug + fix restructuration
</commit_message>
<xml_diff>
--- a/doc/Rapport_Devoir3.pptx
+++ b/doc/Rapport_Devoir3.pptx
@@ -915,7 +915,7 @@
           <a:p>
             <a:fld id="{536D1BE0-9163-4941-8556-7FE0B29195A4}" type="datetimeFigureOut">
               <a:rPr lang="en-GB" smtClean="0"/>
-              <a:t>21/03/2025</a:t>
+              <a:t>23/03/2025</a:t>
             </a:fld>
             <a:endParaRPr lang="en-GB"/>
           </a:p>
@@ -1332,7 +1332,7 @@
           <a:p>
             <a:fld id="{CEFDEF93-0E3A-4A89-BC16-F38BAE82060D}" type="datetimeFigureOut">
               <a:rPr lang="en-GB" smtClean="0"/>
-              <a:t>21/03/2025</a:t>
+              <a:t>23/03/2025</a:t>
             </a:fld>
             <a:endParaRPr lang="en-GB"/>
           </a:p>
@@ -1532,7 +1532,7 @@
           <a:p>
             <a:fld id="{CEFDEF93-0E3A-4A89-BC16-F38BAE82060D}" type="datetimeFigureOut">
               <a:rPr lang="en-GB" smtClean="0"/>
-              <a:t>21/03/2025</a:t>
+              <a:t>23/03/2025</a:t>
             </a:fld>
             <a:endParaRPr lang="en-GB"/>
           </a:p>
@@ -1742,7 +1742,7 @@
           <a:p>
             <a:fld id="{CEFDEF93-0E3A-4A89-BC16-F38BAE82060D}" type="datetimeFigureOut">
               <a:rPr lang="en-GB" smtClean="0"/>
-              <a:t>21/03/2025</a:t>
+              <a:t>23/03/2025</a:t>
             </a:fld>
             <a:endParaRPr lang="en-GB"/>
           </a:p>
@@ -1942,7 +1942,7 @@
           <a:p>
             <a:fld id="{CEFDEF93-0E3A-4A89-BC16-F38BAE82060D}" type="datetimeFigureOut">
               <a:rPr lang="en-GB" smtClean="0"/>
-              <a:t>21/03/2025</a:t>
+              <a:t>23/03/2025</a:t>
             </a:fld>
             <a:endParaRPr lang="en-GB"/>
           </a:p>
@@ -2218,7 +2218,7 @@
           <a:p>
             <a:fld id="{CEFDEF93-0E3A-4A89-BC16-F38BAE82060D}" type="datetimeFigureOut">
               <a:rPr lang="en-GB" smtClean="0"/>
-              <a:t>21/03/2025</a:t>
+              <a:t>23/03/2025</a:t>
             </a:fld>
             <a:endParaRPr lang="en-GB"/>
           </a:p>
@@ -2486,7 +2486,7 @@
           <a:p>
             <a:fld id="{CEFDEF93-0E3A-4A89-BC16-F38BAE82060D}" type="datetimeFigureOut">
               <a:rPr lang="en-GB" smtClean="0"/>
-              <a:t>21/03/2025</a:t>
+              <a:t>23/03/2025</a:t>
             </a:fld>
             <a:endParaRPr lang="en-GB"/>
           </a:p>
@@ -2901,7 +2901,7 @@
           <a:p>
             <a:fld id="{CEFDEF93-0E3A-4A89-BC16-F38BAE82060D}" type="datetimeFigureOut">
               <a:rPr lang="en-GB" smtClean="0"/>
-              <a:t>21/03/2025</a:t>
+              <a:t>23/03/2025</a:t>
             </a:fld>
             <a:endParaRPr lang="en-GB"/>
           </a:p>
@@ -3043,7 +3043,7 @@
           <a:p>
             <a:fld id="{CEFDEF93-0E3A-4A89-BC16-F38BAE82060D}" type="datetimeFigureOut">
               <a:rPr lang="en-GB" smtClean="0"/>
-              <a:t>21/03/2025</a:t>
+              <a:t>23/03/2025</a:t>
             </a:fld>
             <a:endParaRPr lang="en-GB"/>
           </a:p>
@@ -3156,7 +3156,7 @@
           <a:p>
             <a:fld id="{CEFDEF93-0E3A-4A89-BC16-F38BAE82060D}" type="datetimeFigureOut">
               <a:rPr lang="en-GB" smtClean="0"/>
-              <a:t>21/03/2025</a:t>
+              <a:t>23/03/2025</a:t>
             </a:fld>
             <a:endParaRPr lang="en-GB"/>
           </a:p>
@@ -3469,7 +3469,7 @@
           <a:p>
             <a:fld id="{CEFDEF93-0E3A-4A89-BC16-F38BAE82060D}" type="datetimeFigureOut">
               <a:rPr lang="en-GB" smtClean="0"/>
-              <a:t>21/03/2025</a:t>
+              <a:t>23/03/2025</a:t>
             </a:fld>
             <a:endParaRPr lang="en-GB"/>
           </a:p>
@@ -3758,7 +3758,7 @@
           <a:p>
             <a:fld id="{CEFDEF93-0E3A-4A89-BC16-F38BAE82060D}" type="datetimeFigureOut">
               <a:rPr lang="en-GB" smtClean="0"/>
-              <a:t>21/03/2025</a:t>
+              <a:t>23/03/2025</a:t>
             </a:fld>
             <a:endParaRPr lang="en-GB"/>
           </a:p>
@@ -4001,7 +4001,7 @@
           <a:p>
             <a:fld id="{CEFDEF93-0E3A-4A89-BC16-F38BAE82060D}" type="datetimeFigureOut">
               <a:rPr lang="en-GB" smtClean="0"/>
-              <a:t>21/03/2025</a:t>
+              <a:t>23/03/2025</a:t>
             </a:fld>
             <a:endParaRPr lang="en-GB"/>
           </a:p>
@@ -5233,7 +5233,7 @@
                 <a:latin typeface="Times New Roman" panose="02020603050405020304" pitchFamily="18" charset="0"/>
                 <a:cs typeface="Times New Roman" panose="02020603050405020304" pitchFamily="18" charset="0"/>
               </a:rPr>
-              <a:t>/10</a:t>
+              <a:t>/8</a:t>
             </a:r>
           </a:p>
         </p:txBody>
@@ -6515,14 +6515,14 @@
                 <a:latin typeface="Times New Roman" panose="02020603050405020304" pitchFamily="18" charset="0"/>
                 <a:cs typeface="Times New Roman" panose="02020603050405020304" pitchFamily="18" charset="0"/>
               </a:rPr>
-              <a:t>1</a:t>
+              <a:t>2</a:t>
             </a:r>
             <a:r>
               <a:rPr lang="fr-FR" sz="1400" noProof="0" dirty="0">
                 <a:latin typeface="Times New Roman" panose="02020603050405020304" pitchFamily="18" charset="0"/>
                 <a:cs typeface="Times New Roman" panose="02020603050405020304" pitchFamily="18" charset="0"/>
               </a:rPr>
-              <a:t>/10</a:t>
+              <a:t>/8</a:t>
             </a:r>
           </a:p>
         </p:txBody>
@@ -7969,14 +7969,14 @@
                 <a:latin typeface="Times New Roman" panose="02020603050405020304" pitchFamily="18" charset="0"/>
                 <a:cs typeface="Times New Roman" panose="02020603050405020304" pitchFamily="18" charset="0"/>
               </a:rPr>
-              <a:t>1</a:t>
+              <a:t>3</a:t>
             </a:r>
             <a:r>
               <a:rPr lang="fr-FR" sz="1400" noProof="0" dirty="0">
                 <a:latin typeface="Times New Roman" panose="02020603050405020304" pitchFamily="18" charset="0"/>
                 <a:cs typeface="Times New Roman" panose="02020603050405020304" pitchFamily="18" charset="0"/>
               </a:rPr>
-              <a:t>/10</a:t>
+              <a:t>/8</a:t>
             </a:r>
           </a:p>
         </p:txBody>
@@ -9324,14 +9324,14 @@
                 <a:latin typeface="Times New Roman" panose="02020603050405020304" pitchFamily="18" charset="0"/>
                 <a:cs typeface="Times New Roman" panose="02020603050405020304" pitchFamily="18" charset="0"/>
               </a:rPr>
-              <a:t>1</a:t>
+              <a:t>4</a:t>
             </a:r>
             <a:r>
               <a:rPr lang="fr-FR" sz="1400" noProof="0" dirty="0">
                 <a:latin typeface="Times New Roman" panose="02020603050405020304" pitchFamily="18" charset="0"/>
                 <a:cs typeface="Times New Roman" panose="02020603050405020304" pitchFamily="18" charset="0"/>
               </a:rPr>
-              <a:t>/10</a:t>
+              <a:t>/8</a:t>
             </a:r>
           </a:p>
         </p:txBody>
@@ -10058,15 +10058,26 @@
                 <a:latin typeface="Times New Roman" panose="02020603050405020304" pitchFamily="18" charset="0"/>
                 <a:cs typeface="Times New Roman" panose="02020603050405020304" pitchFamily="18" charset="0"/>
               </a:rPr>
-              <a:t>1</a:t>
+              <a:t>5</a:t>
             </a:r>
             <a:r>
               <a:rPr lang="fr-FR" sz="1400" noProof="0" dirty="0">
                 <a:latin typeface="Times New Roman" panose="02020603050405020304" pitchFamily="18" charset="0"/>
                 <a:cs typeface="Times New Roman" panose="02020603050405020304" pitchFamily="18" charset="0"/>
               </a:rPr>
-              <a:t>/10</a:t>
+              <a:t>/</a:t>
             </a:r>
+            <a:r>
+              <a:rPr lang="fr-FR" sz="1400" dirty="0">
+                <a:latin typeface="Times New Roman" panose="02020603050405020304" pitchFamily="18" charset="0"/>
+                <a:cs typeface="Times New Roman" panose="02020603050405020304" pitchFamily="18" charset="0"/>
+              </a:rPr>
+              <a:t>8</a:t>
+            </a:r>
+            <a:endParaRPr lang="fr-FR" sz="1400" noProof="0" dirty="0">
+              <a:latin typeface="Times New Roman" panose="02020603050405020304" pitchFamily="18" charset="0"/>
+              <a:cs typeface="Times New Roman" panose="02020603050405020304" pitchFamily="18" charset="0"/>
+            </a:endParaRPr>
           </a:p>
         </p:txBody>
       </p:sp>
@@ -11380,14 +11391,14 @@
                 <a:latin typeface="Times New Roman" panose="02020603050405020304" pitchFamily="18" charset="0"/>
                 <a:cs typeface="Times New Roman" panose="02020603050405020304" pitchFamily="18" charset="0"/>
               </a:rPr>
-              <a:t>1</a:t>
+              <a:t>6</a:t>
             </a:r>
             <a:r>
               <a:rPr lang="fr-FR" sz="1400" noProof="0" dirty="0">
                 <a:latin typeface="Times New Roman" panose="02020603050405020304" pitchFamily="18" charset="0"/>
                 <a:cs typeface="Times New Roman" panose="02020603050405020304" pitchFamily="18" charset="0"/>
               </a:rPr>
-              <a:t>/10</a:t>
+              <a:t>/8</a:t>
             </a:r>
           </a:p>
         </p:txBody>
@@ -12305,14 +12316,14 @@
                 <a:latin typeface="Times New Roman" panose="02020603050405020304" pitchFamily="18" charset="0"/>
                 <a:cs typeface="Times New Roman" panose="02020603050405020304" pitchFamily="18" charset="0"/>
               </a:rPr>
-              <a:t>1</a:t>
+              <a:t>7</a:t>
             </a:r>
             <a:r>
               <a:rPr lang="fr-FR" sz="1400" noProof="0" dirty="0">
                 <a:latin typeface="Times New Roman" panose="02020603050405020304" pitchFamily="18" charset="0"/>
                 <a:cs typeface="Times New Roman" panose="02020603050405020304" pitchFamily="18" charset="0"/>
               </a:rPr>
-              <a:t>/10</a:t>
+              <a:t>/8</a:t>
             </a:r>
           </a:p>
         </p:txBody>
@@ -13637,14 +13648,14 @@
                 <a:latin typeface="Times New Roman" panose="02020603050405020304" pitchFamily="18" charset="0"/>
                 <a:cs typeface="Times New Roman" panose="02020603050405020304" pitchFamily="18" charset="0"/>
               </a:rPr>
-              <a:t>1</a:t>
+              <a:t>8</a:t>
             </a:r>
             <a:r>
               <a:rPr lang="fr-FR" sz="1400" noProof="0" dirty="0">
                 <a:latin typeface="Times New Roman" panose="02020603050405020304" pitchFamily="18" charset="0"/>
                 <a:cs typeface="Times New Roman" panose="02020603050405020304" pitchFamily="18" charset="0"/>
               </a:rPr>
-              <a:t>/10</a:t>
+              <a:t>/8</a:t>
             </a:r>
           </a:p>
         </p:txBody>

</xml_diff>

<commit_message>
j'avais pas tout push
</commit_message>
<xml_diff>
--- a/doc/Rapport_Devoir3.pptx
+++ b/doc/Rapport_Devoir3.pptx
@@ -1222,7 +1222,7 @@
           <a:bodyPr/>
           <a:lstStyle/>
           <a:p>
-            <a:fld id="{CEFDEF93-0E3A-4A89-BC16-F38BAE82060D}" type="datetimeFigureOut">
+            <a:fld id="{D6B2E909-1E8B-490A-90AE-456EAFEC45F4}" type="datetime1">
               <a:rPr lang="en-GB" smtClean="0"/>
               <a:t>26/03/2025</a:t>
             </a:fld>
@@ -1280,7 +1280,7 @@
               <a:rPr lang="en-GB" smtClean="0"/>
               <a:t>‹#›</a:t>
             </a:fld>
-            <a:endParaRPr lang="en-GB"/>
+            <a:endParaRPr lang="en-GB" dirty="0"/>
           </a:p>
         </p:txBody>
       </p:sp>
@@ -1422,7 +1422,7 @@
           <a:bodyPr/>
           <a:lstStyle/>
           <a:p>
-            <a:fld id="{CEFDEF93-0E3A-4A89-BC16-F38BAE82060D}" type="datetimeFigureOut">
+            <a:fld id="{92C34E1D-B36D-4230-93B8-D7EE6E8C0511}" type="datetime1">
               <a:rPr lang="en-GB" smtClean="0"/>
               <a:t>26/03/2025</a:t>
             </a:fld>
@@ -1632,7 +1632,7 @@
           <a:bodyPr/>
           <a:lstStyle/>
           <a:p>
-            <a:fld id="{CEFDEF93-0E3A-4A89-BC16-F38BAE82060D}" type="datetimeFigureOut">
+            <a:fld id="{4FC01948-6196-40B9-BCBD-59107A9B1F9E}" type="datetime1">
               <a:rPr lang="en-GB" smtClean="0"/>
               <a:t>26/03/2025</a:t>
             </a:fld>
@@ -1832,7 +1832,7 @@
           <a:bodyPr/>
           <a:lstStyle/>
           <a:p>
-            <a:fld id="{CEFDEF93-0E3A-4A89-BC16-F38BAE82060D}" type="datetimeFigureOut">
+            <a:fld id="{4C0CDDEC-1757-4EE0-9128-4BC55E64EFE5}" type="datetime1">
               <a:rPr lang="en-GB" smtClean="0"/>
               <a:t>26/03/2025</a:t>
             </a:fld>
@@ -2108,7 +2108,7 @@
           <a:bodyPr/>
           <a:lstStyle/>
           <a:p>
-            <a:fld id="{CEFDEF93-0E3A-4A89-BC16-F38BAE82060D}" type="datetimeFigureOut">
+            <a:fld id="{62C963ED-4E2A-401C-99D8-D5828923A936}" type="datetime1">
               <a:rPr lang="en-GB" smtClean="0"/>
               <a:t>26/03/2025</a:t>
             </a:fld>
@@ -2376,7 +2376,7 @@
           <a:bodyPr/>
           <a:lstStyle/>
           <a:p>
-            <a:fld id="{CEFDEF93-0E3A-4A89-BC16-F38BAE82060D}" type="datetimeFigureOut">
+            <a:fld id="{87C91C69-9FE7-4451-BF75-6A2FD63030A9}" type="datetime1">
               <a:rPr lang="en-GB" smtClean="0"/>
               <a:t>26/03/2025</a:t>
             </a:fld>
@@ -2791,7 +2791,7 @@
           <a:bodyPr/>
           <a:lstStyle/>
           <a:p>
-            <a:fld id="{CEFDEF93-0E3A-4A89-BC16-F38BAE82060D}" type="datetimeFigureOut">
+            <a:fld id="{C07DCF1B-1979-4894-BFD4-7C24230EA146}" type="datetime1">
               <a:rPr lang="en-GB" smtClean="0"/>
               <a:t>26/03/2025</a:t>
             </a:fld>
@@ -2933,7 +2933,7 @@
           <a:bodyPr/>
           <a:lstStyle/>
           <a:p>
-            <a:fld id="{CEFDEF93-0E3A-4A89-BC16-F38BAE82060D}" type="datetimeFigureOut">
+            <a:fld id="{636DF88A-124B-4722-B579-90B03BE5B135}" type="datetime1">
               <a:rPr lang="en-GB" smtClean="0"/>
               <a:t>26/03/2025</a:t>
             </a:fld>
@@ -3046,7 +3046,7 @@
           <a:bodyPr/>
           <a:lstStyle/>
           <a:p>
-            <a:fld id="{CEFDEF93-0E3A-4A89-BC16-F38BAE82060D}" type="datetimeFigureOut">
+            <a:fld id="{6499F9BD-D035-429A-8061-D1A92B444FBC}" type="datetime1">
               <a:rPr lang="en-GB" smtClean="0"/>
               <a:t>26/03/2025</a:t>
             </a:fld>
@@ -3359,7 +3359,7 @@
           <a:bodyPr/>
           <a:lstStyle/>
           <a:p>
-            <a:fld id="{CEFDEF93-0E3A-4A89-BC16-F38BAE82060D}" type="datetimeFigureOut">
+            <a:fld id="{FC2FF2E1-9BE9-486C-A52B-CC440E47AB02}" type="datetime1">
               <a:rPr lang="en-GB" smtClean="0"/>
               <a:t>26/03/2025</a:t>
             </a:fld>
@@ -3648,7 +3648,7 @@
           <a:bodyPr/>
           <a:lstStyle/>
           <a:p>
-            <a:fld id="{CEFDEF93-0E3A-4A89-BC16-F38BAE82060D}" type="datetimeFigureOut">
+            <a:fld id="{B3680D87-8B9C-4BA2-B572-BDB70FC0D7A7}" type="datetime1">
               <a:rPr lang="en-GB" smtClean="0"/>
               <a:t>26/03/2025</a:t>
             </a:fld>
@@ -3891,7 +3891,7 @@
             </a:lvl1pPr>
           </a:lstStyle>
           <a:p>
-            <a:fld id="{CEFDEF93-0E3A-4A89-BC16-F38BAE82060D}" type="datetimeFigureOut">
+            <a:fld id="{E829B7AE-D91D-400B-9228-ECCB52866AD0}" type="datetime1">
               <a:rPr lang="en-GB" smtClean="0"/>
               <a:t>26/03/2025</a:t>
             </a:fld>
@@ -3960,7 +3960,7 @@
         </p:nvSpPr>
         <p:spPr>
           <a:xfrm>
-            <a:off x="8610600" y="6356350"/>
+            <a:off x="9448800" y="6548291"/>
             <a:ext cx="2743200" cy="365125"/>
           </a:xfrm>
           <a:prstGeom prst="rect">
@@ -3973,9 +3973,7 @@
             <a:lvl1pPr algn="r">
               <a:defRPr sz="1200">
                 <a:solidFill>
-                  <a:schemeClr val="tx1">
-                    <a:tint val="82000"/>
-                  </a:schemeClr>
+                  <a:schemeClr val="tx1"/>
                 </a:solidFill>
               </a:defRPr>
             </a:lvl1pPr>
@@ -3983,9 +3981,10 @@
           <a:p>
             <a:fld id="{74DDA11D-2719-4AB3-AAA7-DB2910A56E08}" type="slidenum">
               <a:rPr lang="en-GB" smtClean="0"/>
+              <a:pPr/>
               <a:t>‹#›</a:t>
             </a:fld>
-            <a:endParaRPr lang="en-GB"/>
+            <a:endParaRPr lang="en-GB" dirty="0"/>
           </a:p>
         </p:txBody>
       </p:sp>
@@ -4010,6 +4009,7 @@
     <p:sldLayoutId id="2147483658" r:id="rId10"/>
     <p:sldLayoutId id="2147483659" r:id="rId11"/>
   </p:sldLayoutIdLst>
+  <p:hf hdr="0" ftr="0" dt="0"/>
   <p:txStyles>
     <p:titleStyle>
       <a:lvl1pPr algn="l" defTabSz="914400" rtl="0" eaLnBrk="1" latinLnBrk="0" hangingPunct="1">
@@ -4866,6 +4866,35 @@
           </a:p>
         </p:txBody>
       </p:sp>
+      <p:sp>
+        <p:nvSpPr>
+          <p:cNvPr id="10" name="Slide Number Placeholder 9">
+            <a:extLst>
+              <a:ext uri="{FF2B5EF4-FFF2-40B4-BE49-F238E27FC236}">
+                <a16:creationId xmlns:a16="http://schemas.microsoft.com/office/drawing/2014/main" id="{29CAE012-D9F6-EF5F-ED67-6378587E51A0}"/>
+              </a:ext>
+            </a:extLst>
+          </p:cNvPr>
+          <p:cNvSpPr>
+            <a:spLocks noGrp="1"/>
+          </p:cNvSpPr>
+          <p:nvPr>
+            <p:ph type="sldNum" sz="quarter" idx="12"/>
+          </p:nvPr>
+        </p:nvSpPr>
+        <p:spPr/>
+        <p:txBody>
+          <a:bodyPr/>
+          <a:lstStyle/>
+          <a:p>
+            <a:fld id="{74DDA11D-2719-4AB3-AAA7-DB2910A56E08}" type="slidenum">
+              <a:rPr lang="en-GB" smtClean="0"/>
+              <a:t>1</a:t>
+            </a:fld>
+            <a:endParaRPr lang="en-GB" dirty="0"/>
+          </a:p>
+        </p:txBody>
+      </p:sp>
     </p:spTree>
     <p:extLst>
       <p:ext uri="{BB962C8B-B14F-4D97-AF65-F5344CB8AC3E}">
@@ -5048,52 +5077,6 @@
           </a:p>
         </p:txBody>
       </p:sp>
-      <p:sp>
-        <p:nvSpPr>
-          <p:cNvPr id="47" name="TextBox 46">
-            <a:extLst>
-              <a:ext uri="{FF2B5EF4-FFF2-40B4-BE49-F238E27FC236}">
-                <a16:creationId xmlns:a16="http://schemas.microsoft.com/office/drawing/2014/main" id="{9B6E5297-92A4-E6FA-3ECB-9355CBDD1FF3}"/>
-              </a:ext>
-            </a:extLst>
-          </p:cNvPr>
-          <p:cNvSpPr txBox="1"/>
-          <p:nvPr/>
-        </p:nvSpPr>
-        <p:spPr>
-          <a:xfrm>
-            <a:off x="11091333" y="6550222"/>
-            <a:ext cx="1100667" cy="307777"/>
-          </a:xfrm>
-          <a:prstGeom prst="rect">
-            <a:avLst/>
-          </a:prstGeom>
-          <a:noFill/>
-        </p:spPr>
-        <p:txBody>
-          <a:bodyPr wrap="square" rtlCol="0">
-            <a:spAutoFit/>
-          </a:bodyPr>
-          <a:lstStyle/>
-          <a:p>
-            <a:pPr algn="r"/>
-            <a:r>
-              <a:rPr lang="fr-FR" sz="1400" dirty="0">
-                <a:latin typeface="Times New Roman" panose="02020603050405020304" pitchFamily="18" charset="0"/>
-                <a:cs typeface="Times New Roman" panose="02020603050405020304" pitchFamily="18" charset="0"/>
-              </a:rPr>
-              <a:t>1</a:t>
-            </a:r>
-            <a:r>
-              <a:rPr lang="fr-FR" sz="1400" noProof="0" dirty="0">
-                <a:latin typeface="Times New Roman" panose="02020603050405020304" pitchFamily="18" charset="0"/>
-                <a:cs typeface="Times New Roman" panose="02020603050405020304" pitchFamily="18" charset="0"/>
-              </a:rPr>
-              <a:t>/10</a:t>
-            </a:r>
-          </a:p>
-        </p:txBody>
-      </p:sp>
       <mc:AlternateContent xmlns:mc="http://schemas.openxmlformats.org/markup-compatibility/2006" xmlns:a14="http://schemas.microsoft.com/office/drawing/2010/main">
         <mc:Choice Requires="a14">
           <p:sp>
@@ -5791,6 +5774,35 @@
           </p:sp>
         </mc:Fallback>
       </mc:AlternateContent>
+      <p:sp>
+        <p:nvSpPr>
+          <p:cNvPr id="3" name="Slide Number Placeholder 2">
+            <a:extLst>
+              <a:ext uri="{FF2B5EF4-FFF2-40B4-BE49-F238E27FC236}">
+                <a16:creationId xmlns:a16="http://schemas.microsoft.com/office/drawing/2014/main" id="{988932C2-55DB-AE57-1A80-96CD49E4E2F0}"/>
+              </a:ext>
+            </a:extLst>
+          </p:cNvPr>
+          <p:cNvSpPr>
+            <a:spLocks noGrp="1"/>
+          </p:cNvSpPr>
+          <p:nvPr>
+            <p:ph type="sldNum" sz="quarter" idx="12"/>
+          </p:nvPr>
+        </p:nvSpPr>
+        <p:spPr/>
+        <p:txBody>
+          <a:bodyPr/>
+          <a:lstStyle/>
+          <a:p>
+            <a:fld id="{74DDA11D-2719-4AB3-AAA7-DB2910A56E08}" type="slidenum">
+              <a:rPr lang="en-GB" smtClean="0"/>
+              <a:t>10</a:t>
+            </a:fld>
+            <a:endParaRPr lang="en-GB" dirty="0"/>
+          </a:p>
+        </p:txBody>
+      </p:sp>
     </p:spTree>
     <p:extLst>
       <p:ext uri="{BB962C8B-B14F-4D97-AF65-F5344CB8AC3E}">
@@ -5970,52 +5982,6 @@
           <a:p>
             <a:pPr algn="ctr"/>
             <a:endParaRPr lang="fr-FR" noProof="0" dirty="0"/>
-          </a:p>
-        </p:txBody>
-      </p:sp>
-      <p:sp>
-        <p:nvSpPr>
-          <p:cNvPr id="47" name="TextBox 46">
-            <a:extLst>
-              <a:ext uri="{FF2B5EF4-FFF2-40B4-BE49-F238E27FC236}">
-                <a16:creationId xmlns:a16="http://schemas.microsoft.com/office/drawing/2014/main" id="{BB6A4DA5-BB88-A44C-F30F-98778E99D02D}"/>
-              </a:ext>
-            </a:extLst>
-          </p:cNvPr>
-          <p:cNvSpPr txBox="1"/>
-          <p:nvPr/>
-        </p:nvSpPr>
-        <p:spPr>
-          <a:xfrm>
-            <a:off x="11091333" y="6550222"/>
-            <a:ext cx="1100667" cy="307777"/>
-          </a:xfrm>
-          <a:prstGeom prst="rect">
-            <a:avLst/>
-          </a:prstGeom>
-          <a:noFill/>
-        </p:spPr>
-        <p:txBody>
-          <a:bodyPr wrap="square" rtlCol="0">
-            <a:spAutoFit/>
-          </a:bodyPr>
-          <a:lstStyle/>
-          <a:p>
-            <a:pPr algn="r"/>
-            <a:r>
-              <a:rPr lang="fr-FR" sz="1400" dirty="0">
-                <a:latin typeface="Times New Roman" panose="02020603050405020304" pitchFamily="18" charset="0"/>
-                <a:cs typeface="Times New Roman" panose="02020603050405020304" pitchFamily="18" charset="0"/>
-              </a:rPr>
-              <a:t>1</a:t>
-            </a:r>
-            <a:r>
-              <a:rPr lang="fr-FR" sz="1400" noProof="0" dirty="0">
-                <a:latin typeface="Times New Roman" panose="02020603050405020304" pitchFamily="18" charset="0"/>
-                <a:cs typeface="Times New Roman" panose="02020603050405020304" pitchFamily="18" charset="0"/>
-              </a:rPr>
-              <a:t>/10</a:t>
-            </a:r>
           </a:p>
         </p:txBody>
       </p:sp>
@@ -7314,6 +7280,35 @@
           </p:sp>
         </mc:Fallback>
       </mc:AlternateContent>
+      <p:sp>
+        <p:nvSpPr>
+          <p:cNvPr id="3" name="Slide Number Placeholder 2">
+            <a:extLst>
+              <a:ext uri="{FF2B5EF4-FFF2-40B4-BE49-F238E27FC236}">
+                <a16:creationId xmlns:a16="http://schemas.microsoft.com/office/drawing/2014/main" id="{393C6C75-51D6-A7F0-2D80-F849190C70D8}"/>
+              </a:ext>
+            </a:extLst>
+          </p:cNvPr>
+          <p:cNvSpPr>
+            <a:spLocks noGrp="1"/>
+          </p:cNvSpPr>
+          <p:nvPr>
+            <p:ph type="sldNum" sz="quarter" idx="12"/>
+          </p:nvPr>
+        </p:nvSpPr>
+        <p:spPr/>
+        <p:txBody>
+          <a:bodyPr/>
+          <a:lstStyle/>
+          <a:p>
+            <a:fld id="{74DDA11D-2719-4AB3-AAA7-DB2910A56E08}" type="slidenum">
+              <a:rPr lang="en-GB" smtClean="0"/>
+              <a:t>11</a:t>
+            </a:fld>
+            <a:endParaRPr lang="en-GB" dirty="0"/>
+          </a:p>
+        </p:txBody>
+      </p:sp>
     </p:spTree>
     <p:extLst>
       <p:ext uri="{BB962C8B-B14F-4D97-AF65-F5344CB8AC3E}">
@@ -7493,52 +7488,6 @@
           <a:p>
             <a:pPr algn="ctr"/>
             <a:endParaRPr lang="fr-FR" noProof="0" dirty="0"/>
-          </a:p>
-        </p:txBody>
-      </p:sp>
-      <p:sp>
-        <p:nvSpPr>
-          <p:cNvPr id="47" name="TextBox 46">
-            <a:extLst>
-              <a:ext uri="{FF2B5EF4-FFF2-40B4-BE49-F238E27FC236}">
-                <a16:creationId xmlns:a16="http://schemas.microsoft.com/office/drawing/2014/main" id="{50A03518-25BD-560A-208B-55D7A20B591B}"/>
-              </a:ext>
-            </a:extLst>
-          </p:cNvPr>
-          <p:cNvSpPr txBox="1"/>
-          <p:nvPr/>
-        </p:nvSpPr>
-        <p:spPr>
-          <a:xfrm>
-            <a:off x="11091333" y="6550222"/>
-            <a:ext cx="1100667" cy="307777"/>
-          </a:xfrm>
-          <a:prstGeom prst="rect">
-            <a:avLst/>
-          </a:prstGeom>
-          <a:noFill/>
-        </p:spPr>
-        <p:txBody>
-          <a:bodyPr wrap="square" rtlCol="0">
-            <a:spAutoFit/>
-          </a:bodyPr>
-          <a:lstStyle/>
-          <a:p>
-            <a:pPr algn="r"/>
-            <a:r>
-              <a:rPr lang="fr-FR" sz="1400" dirty="0">
-                <a:latin typeface="Times New Roman" panose="02020603050405020304" pitchFamily="18" charset="0"/>
-                <a:cs typeface="Times New Roman" panose="02020603050405020304" pitchFamily="18" charset="0"/>
-              </a:rPr>
-              <a:t>1</a:t>
-            </a:r>
-            <a:r>
-              <a:rPr lang="fr-FR" sz="1400" noProof="0" dirty="0">
-                <a:latin typeface="Times New Roman" panose="02020603050405020304" pitchFamily="18" charset="0"/>
-                <a:cs typeface="Times New Roman" panose="02020603050405020304" pitchFamily="18" charset="0"/>
-              </a:rPr>
-              <a:t>/10</a:t>
-            </a:r>
           </a:p>
         </p:txBody>
       </p:sp>
@@ -8822,6 +8771,35 @@
           </a:p>
         </p:txBody>
       </p:sp>
+      <p:sp>
+        <p:nvSpPr>
+          <p:cNvPr id="3" name="Slide Number Placeholder 2">
+            <a:extLst>
+              <a:ext uri="{FF2B5EF4-FFF2-40B4-BE49-F238E27FC236}">
+                <a16:creationId xmlns:a16="http://schemas.microsoft.com/office/drawing/2014/main" id="{E6933238-F382-9548-E74A-493E620F1B0E}"/>
+              </a:ext>
+            </a:extLst>
+          </p:cNvPr>
+          <p:cNvSpPr>
+            <a:spLocks noGrp="1"/>
+          </p:cNvSpPr>
+          <p:nvPr>
+            <p:ph type="sldNum" sz="quarter" idx="12"/>
+          </p:nvPr>
+        </p:nvSpPr>
+        <p:spPr/>
+        <p:txBody>
+          <a:bodyPr/>
+          <a:lstStyle/>
+          <a:p>
+            <a:fld id="{74DDA11D-2719-4AB3-AAA7-DB2910A56E08}" type="slidenum">
+              <a:rPr lang="en-GB" smtClean="0"/>
+              <a:t>12</a:t>
+            </a:fld>
+            <a:endParaRPr lang="en-GB" dirty="0"/>
+          </a:p>
+        </p:txBody>
+      </p:sp>
     </p:spTree>
     <p:extLst>
       <p:ext uri="{BB962C8B-B14F-4D97-AF65-F5344CB8AC3E}">
@@ -9001,52 +8979,6 @@
           <a:p>
             <a:pPr algn="ctr"/>
             <a:endParaRPr lang="fr-FR" noProof="0" dirty="0"/>
-          </a:p>
-        </p:txBody>
-      </p:sp>
-      <p:sp>
-        <p:nvSpPr>
-          <p:cNvPr id="47" name="TextBox 46">
-            <a:extLst>
-              <a:ext uri="{FF2B5EF4-FFF2-40B4-BE49-F238E27FC236}">
-                <a16:creationId xmlns:a16="http://schemas.microsoft.com/office/drawing/2014/main" id="{9FB5FC2D-66F1-36CF-6B5B-3BB7B278FB3F}"/>
-              </a:ext>
-            </a:extLst>
-          </p:cNvPr>
-          <p:cNvSpPr txBox="1"/>
-          <p:nvPr/>
-        </p:nvSpPr>
-        <p:spPr>
-          <a:xfrm>
-            <a:off x="11091333" y="6550222"/>
-            <a:ext cx="1100667" cy="307777"/>
-          </a:xfrm>
-          <a:prstGeom prst="rect">
-            <a:avLst/>
-          </a:prstGeom>
-          <a:noFill/>
-        </p:spPr>
-        <p:txBody>
-          <a:bodyPr wrap="square" rtlCol="0">
-            <a:spAutoFit/>
-          </a:bodyPr>
-          <a:lstStyle/>
-          <a:p>
-            <a:pPr algn="r"/>
-            <a:r>
-              <a:rPr lang="fr-FR" sz="1400" dirty="0">
-                <a:latin typeface="Times New Roman" panose="02020603050405020304" pitchFamily="18" charset="0"/>
-                <a:cs typeface="Times New Roman" panose="02020603050405020304" pitchFamily="18" charset="0"/>
-              </a:rPr>
-              <a:t>1</a:t>
-            </a:r>
-            <a:r>
-              <a:rPr lang="fr-FR" sz="1400" noProof="0" dirty="0">
-                <a:latin typeface="Times New Roman" panose="02020603050405020304" pitchFamily="18" charset="0"/>
-                <a:cs typeface="Times New Roman" panose="02020603050405020304" pitchFamily="18" charset="0"/>
-              </a:rPr>
-              <a:t>/10</a:t>
-            </a:r>
           </a:p>
         </p:txBody>
       </p:sp>
@@ -10342,6 +10274,35 @@
           <a:p>
             <a:pPr algn="ctr"/>
             <a:endParaRPr lang="en-GB"/>
+          </a:p>
+        </p:txBody>
+      </p:sp>
+      <p:sp>
+        <p:nvSpPr>
+          <p:cNvPr id="3" name="Slide Number Placeholder 2">
+            <a:extLst>
+              <a:ext uri="{FF2B5EF4-FFF2-40B4-BE49-F238E27FC236}">
+                <a16:creationId xmlns:a16="http://schemas.microsoft.com/office/drawing/2014/main" id="{08D1613C-D97A-5C66-053C-1145D8F215AE}"/>
+              </a:ext>
+            </a:extLst>
+          </p:cNvPr>
+          <p:cNvSpPr>
+            <a:spLocks noGrp="1"/>
+          </p:cNvSpPr>
+          <p:nvPr>
+            <p:ph type="sldNum" sz="quarter" idx="12"/>
+          </p:nvPr>
+        </p:nvSpPr>
+        <p:spPr/>
+        <p:txBody>
+          <a:bodyPr/>
+          <a:lstStyle/>
+          <a:p>
+            <a:fld id="{74DDA11D-2719-4AB3-AAA7-DB2910A56E08}" type="slidenum">
+              <a:rPr lang="en-GB" smtClean="0"/>
+              <a:t>13</a:t>
+            </a:fld>
+            <a:endParaRPr lang="en-GB" dirty="0"/>
           </a:p>
         </p:txBody>
       </p:sp>
@@ -10560,52 +10521,6 @@
           <a:p>
             <a:pPr algn="ctr"/>
             <a:endParaRPr lang="fr-FR" noProof="0" dirty="0"/>
-          </a:p>
-        </p:txBody>
-      </p:sp>
-      <p:sp>
-        <p:nvSpPr>
-          <p:cNvPr id="47" name="TextBox 46">
-            <a:extLst>
-              <a:ext uri="{FF2B5EF4-FFF2-40B4-BE49-F238E27FC236}">
-                <a16:creationId xmlns:a16="http://schemas.microsoft.com/office/drawing/2014/main" id="{50C49013-565D-03A7-299E-23BD668F0A17}"/>
-              </a:ext>
-            </a:extLst>
-          </p:cNvPr>
-          <p:cNvSpPr txBox="1"/>
-          <p:nvPr/>
-        </p:nvSpPr>
-        <p:spPr>
-          <a:xfrm>
-            <a:off x="11091333" y="6550222"/>
-            <a:ext cx="1100667" cy="307777"/>
-          </a:xfrm>
-          <a:prstGeom prst="rect">
-            <a:avLst/>
-          </a:prstGeom>
-          <a:noFill/>
-        </p:spPr>
-        <p:txBody>
-          <a:bodyPr wrap="square" rtlCol="0">
-            <a:spAutoFit/>
-          </a:bodyPr>
-          <a:lstStyle/>
-          <a:p>
-            <a:pPr algn="r"/>
-            <a:r>
-              <a:rPr lang="fr-FR" sz="1400" dirty="0">
-                <a:latin typeface="Times New Roman" panose="02020603050405020304" pitchFamily="18" charset="0"/>
-                <a:cs typeface="Times New Roman" panose="02020603050405020304" pitchFamily="18" charset="0"/>
-              </a:rPr>
-              <a:t>1</a:t>
-            </a:r>
-            <a:r>
-              <a:rPr lang="fr-FR" sz="1400" noProof="0" dirty="0">
-                <a:latin typeface="Times New Roman" panose="02020603050405020304" pitchFamily="18" charset="0"/>
-                <a:cs typeface="Times New Roman" panose="02020603050405020304" pitchFamily="18" charset="0"/>
-              </a:rPr>
-              <a:t>/10</a:t>
-            </a:r>
           </a:p>
         </p:txBody>
       </p:sp>
@@ -11634,6 +11549,35 @@
           </a:p>
         </p:txBody>
       </p:sp>
+      <p:sp>
+        <p:nvSpPr>
+          <p:cNvPr id="2" name="Slide Number Placeholder 1">
+            <a:extLst>
+              <a:ext uri="{FF2B5EF4-FFF2-40B4-BE49-F238E27FC236}">
+                <a16:creationId xmlns:a16="http://schemas.microsoft.com/office/drawing/2014/main" id="{8A05218C-9392-00A1-40E3-462E4F799B12}"/>
+              </a:ext>
+            </a:extLst>
+          </p:cNvPr>
+          <p:cNvSpPr>
+            <a:spLocks noGrp="1"/>
+          </p:cNvSpPr>
+          <p:nvPr>
+            <p:ph type="sldNum" sz="quarter" idx="12"/>
+          </p:nvPr>
+        </p:nvSpPr>
+        <p:spPr/>
+        <p:txBody>
+          <a:bodyPr/>
+          <a:lstStyle/>
+          <a:p>
+            <a:fld id="{74DDA11D-2719-4AB3-AAA7-DB2910A56E08}" type="slidenum">
+              <a:rPr lang="en-GB" smtClean="0"/>
+              <a:t>2</a:t>
+            </a:fld>
+            <a:endParaRPr lang="en-GB" dirty="0"/>
+          </a:p>
+        </p:txBody>
+      </p:sp>
     </p:spTree>
     <p:extLst>
       <p:ext uri="{BB962C8B-B14F-4D97-AF65-F5344CB8AC3E}">
@@ -11852,52 +11796,6 @@
           </a:p>
         </p:txBody>
       </p:sp>
-      <p:sp>
-        <p:nvSpPr>
-          <p:cNvPr id="47" name="TextBox 46">
-            <a:extLst>
-              <a:ext uri="{FF2B5EF4-FFF2-40B4-BE49-F238E27FC236}">
-                <a16:creationId xmlns:a16="http://schemas.microsoft.com/office/drawing/2014/main" id="{CB9B5C82-E4DB-4035-9D0A-892CB11F9151}"/>
-              </a:ext>
-            </a:extLst>
-          </p:cNvPr>
-          <p:cNvSpPr txBox="1"/>
-          <p:nvPr/>
-        </p:nvSpPr>
-        <p:spPr>
-          <a:xfrm>
-            <a:off x="11091333" y="6550222"/>
-            <a:ext cx="1100667" cy="307777"/>
-          </a:xfrm>
-          <a:prstGeom prst="rect">
-            <a:avLst/>
-          </a:prstGeom>
-          <a:noFill/>
-        </p:spPr>
-        <p:txBody>
-          <a:bodyPr wrap="square" rtlCol="0">
-            <a:spAutoFit/>
-          </a:bodyPr>
-          <a:lstStyle/>
-          <a:p>
-            <a:pPr algn="r"/>
-            <a:r>
-              <a:rPr lang="fr-FR" sz="1400" dirty="0">
-                <a:latin typeface="Times New Roman" panose="02020603050405020304" pitchFamily="18" charset="0"/>
-                <a:cs typeface="Times New Roman" panose="02020603050405020304" pitchFamily="18" charset="0"/>
-              </a:rPr>
-              <a:t>1</a:t>
-            </a:r>
-            <a:r>
-              <a:rPr lang="fr-FR" sz="1400" noProof="0" dirty="0">
-                <a:latin typeface="Times New Roman" panose="02020603050405020304" pitchFamily="18" charset="0"/>
-                <a:cs typeface="Times New Roman" panose="02020603050405020304" pitchFamily="18" charset="0"/>
-              </a:rPr>
-              <a:t>/10</a:t>
-            </a:r>
-          </a:p>
-        </p:txBody>
-      </p:sp>
       <mc:AlternateContent xmlns:mc="http://schemas.openxmlformats.org/markup-compatibility/2006" xmlns:a14="http://schemas.microsoft.com/office/drawing/2010/main">
         <mc:Choice Requires="a14">
           <p:sp>
@@ -12448,14 +12346,7 @@
                               <a:latin typeface="Cambria Math" panose="02040503050406030204" pitchFamily="18" charset="0"/>
                               <a:cs typeface="Times New Roman" panose="02020603050405020304" pitchFamily="18" charset="0"/>
                             </a:rPr>
-                            <m:t>+</m:t>
-                          </m:r>
-                          <m:r>
-                            <a:rPr lang="fr-FR" b="0" i="1" noProof="0" smtClean="0">
-                              <a:latin typeface="Cambria Math" panose="02040503050406030204" pitchFamily="18" charset="0"/>
-                              <a:cs typeface="Times New Roman" panose="02020603050405020304" pitchFamily="18" charset="0"/>
-                            </a:rPr>
-                            <m:t>1</m:t>
+                            <m:t>+1</m:t>
                           </m:r>
                         </m:sup>
                       </m:sSup>
@@ -12591,14 +12482,7 @@
                                       <a:latin typeface="Cambria Math" panose="02040503050406030204" pitchFamily="18" charset="0"/>
                                       <a:cs typeface="Times New Roman" panose="02020603050405020304" pitchFamily="18" charset="0"/>
                                     </a:rPr>
-                                    <m:t>−</m:t>
-                                  </m:r>
-                                  <m:r>
-                                    <a:rPr lang="fr-FR" b="0" i="1" noProof="0" smtClean="0">
-                                      <a:latin typeface="Cambria Math" panose="02040503050406030204" pitchFamily="18" charset="0"/>
-                                      <a:cs typeface="Times New Roman" panose="02020603050405020304" pitchFamily="18" charset="0"/>
-                                    </a:rPr>
-                                    <m:t>1</m:t>
+                                    <m:t>−1</m:t>
                                   </m:r>
                                 </m:e>
                               </m:d>
@@ -13032,28 +12916,7 @@
                         <a:latin typeface="Cambria Math" panose="02040503050406030204" pitchFamily="18" charset="0"/>
                         <a:cs typeface="Times New Roman" panose="02020603050405020304" pitchFamily="18" charset="0"/>
                       </a:rPr>
-                      <m:t>=</m:t>
-                    </m:r>
-                    <m:r>
-                      <a:rPr lang="fr-FR" b="0" i="1" noProof="0" smtClean="0">
-                        <a:latin typeface="Cambria Math" panose="02040503050406030204" pitchFamily="18" charset="0"/>
-                        <a:cs typeface="Times New Roman" panose="02020603050405020304" pitchFamily="18" charset="0"/>
-                      </a:rPr>
-                      <m:t>1</m:t>
-                    </m:r>
-                    <m:r>
-                      <a:rPr lang="fr-FR" b="0" i="1" noProof="0" smtClean="0">
-                        <a:latin typeface="Cambria Math" panose="02040503050406030204" pitchFamily="18" charset="0"/>
-                        <a:cs typeface="Times New Roman" panose="02020603050405020304" pitchFamily="18" charset="0"/>
-                      </a:rPr>
-                      <m:t>.</m:t>
-                    </m:r>
-                    <m:r>
-                      <a:rPr lang="fr-FR" b="0" i="1" noProof="0" smtClean="0">
-                        <a:latin typeface="Cambria Math" panose="02040503050406030204" pitchFamily="18" charset="0"/>
-                        <a:cs typeface="Times New Roman" panose="02020603050405020304" pitchFamily="18" charset="0"/>
-                      </a:rPr>
-                      <m:t>443</m:t>
+                      <m:t>=1.443</m:t>
                     </m:r>
                   </m:oMath>
                 </a14:m>
@@ -13099,14 +12962,7 @@
                         <a:latin typeface="Cambria Math" panose="02040503050406030204" pitchFamily="18" charset="0"/>
                         <a:cs typeface="Times New Roman" panose="02020603050405020304" pitchFamily="18" charset="0"/>
                       </a:rPr>
-                      <m:t>=</m:t>
-                    </m:r>
-                    <m:r>
-                      <a:rPr lang="fr-FR" b="0" i="1" smtClean="0">
-                        <a:latin typeface="Cambria Math" panose="02040503050406030204" pitchFamily="18" charset="0"/>
-                        <a:cs typeface="Times New Roman" panose="02020603050405020304" pitchFamily="18" charset="0"/>
-                      </a:rPr>
-                      <m:t>2</m:t>
+                      <m:t>=2</m:t>
                     </m:r>
                   </m:oMath>
                 </a14:m>
@@ -13166,6 +13022,35 @@
           </p:sp>
         </mc:Fallback>
       </mc:AlternateContent>
+      <p:sp>
+        <p:nvSpPr>
+          <p:cNvPr id="2" name="Slide Number Placeholder 1">
+            <a:extLst>
+              <a:ext uri="{FF2B5EF4-FFF2-40B4-BE49-F238E27FC236}">
+                <a16:creationId xmlns:a16="http://schemas.microsoft.com/office/drawing/2014/main" id="{3AAEA92A-5070-64DD-2EF9-074ED972407A}"/>
+              </a:ext>
+            </a:extLst>
+          </p:cNvPr>
+          <p:cNvSpPr>
+            <a:spLocks noGrp="1"/>
+          </p:cNvSpPr>
+          <p:nvPr>
+            <p:ph type="sldNum" sz="quarter" idx="12"/>
+          </p:nvPr>
+        </p:nvSpPr>
+        <p:spPr/>
+        <p:txBody>
+          <a:bodyPr/>
+          <a:lstStyle/>
+          <a:p>
+            <a:fld id="{74DDA11D-2719-4AB3-AAA7-DB2910A56E08}" type="slidenum">
+              <a:rPr lang="en-GB" smtClean="0"/>
+              <a:t>3</a:t>
+            </a:fld>
+            <a:endParaRPr lang="en-GB" dirty="0"/>
+          </a:p>
+        </p:txBody>
+      </p:sp>
     </p:spTree>
     <p:extLst>
       <p:ext uri="{BB962C8B-B14F-4D97-AF65-F5344CB8AC3E}">
@@ -13381,52 +13266,6 @@
           <a:p>
             <a:pPr algn="ctr"/>
             <a:endParaRPr lang="fr-FR" noProof="0" dirty="0"/>
-          </a:p>
-        </p:txBody>
-      </p:sp>
-      <p:sp>
-        <p:nvSpPr>
-          <p:cNvPr id="47" name="TextBox 46">
-            <a:extLst>
-              <a:ext uri="{FF2B5EF4-FFF2-40B4-BE49-F238E27FC236}">
-                <a16:creationId xmlns:a16="http://schemas.microsoft.com/office/drawing/2014/main" id="{F3BEB388-55A3-25A0-CD7D-64FA861B2AB8}"/>
-              </a:ext>
-            </a:extLst>
-          </p:cNvPr>
-          <p:cNvSpPr txBox="1"/>
-          <p:nvPr/>
-        </p:nvSpPr>
-        <p:spPr>
-          <a:xfrm>
-            <a:off x="11091333" y="6550222"/>
-            <a:ext cx="1100667" cy="307777"/>
-          </a:xfrm>
-          <a:prstGeom prst="rect">
-            <a:avLst/>
-          </a:prstGeom>
-          <a:noFill/>
-        </p:spPr>
-        <p:txBody>
-          <a:bodyPr wrap="square" rtlCol="0">
-            <a:spAutoFit/>
-          </a:bodyPr>
-          <a:lstStyle/>
-          <a:p>
-            <a:pPr algn="r"/>
-            <a:r>
-              <a:rPr lang="fr-FR" sz="1400" dirty="0">
-                <a:latin typeface="Times New Roman" panose="02020603050405020304" pitchFamily="18" charset="0"/>
-                <a:cs typeface="Times New Roman" panose="02020603050405020304" pitchFamily="18" charset="0"/>
-              </a:rPr>
-              <a:t>1</a:t>
-            </a:r>
-            <a:r>
-              <a:rPr lang="fr-FR" sz="1400" noProof="0" dirty="0">
-                <a:latin typeface="Times New Roman" panose="02020603050405020304" pitchFamily="18" charset="0"/>
-                <a:cs typeface="Times New Roman" panose="02020603050405020304" pitchFamily="18" charset="0"/>
-              </a:rPr>
-              <a:t>/10</a:t>
-            </a:r>
           </a:p>
         </p:txBody>
       </p:sp>
@@ -14518,6 +14357,9 @@
                 <a:pPr algn="just"/>
                 <a:r>
                   <a:rPr lang="fr-FR" dirty="0">
+                    <a:highlight>
+                      <a:srgbClr val="FFFF00"/>
+                    </a:highlight>
                     <a:latin typeface="Times New Roman" panose="02020603050405020304" pitchFamily="18" charset="0"/>
                     <a:cs typeface="Times New Roman" panose="02020603050405020304" pitchFamily="18" charset="0"/>
                   </a:rPr>
@@ -14530,6 +14372,9 @@
                         <m:chr m:val="̂"/>
                         <m:ctrlPr>
                           <a:rPr lang="fr-FR" b="0" i="1" dirty="0" smtClean="0">
+                            <a:highlight>
+                              <a:srgbClr val="FFFF00"/>
+                            </a:highlight>
                             <a:latin typeface="Cambria Math" panose="02040503050406030204" pitchFamily="18" charset="0"/>
                             <a:cs typeface="Times New Roman" panose="02020603050405020304" pitchFamily="18" charset="0"/>
                           </a:rPr>
@@ -14538,6 +14383,9 @@
                       <m:e>
                         <m:r>
                           <a:rPr lang="fr-FR" b="0" i="1" dirty="0" smtClean="0">
+                            <a:highlight>
+                              <a:srgbClr val="FFFF00"/>
+                            </a:highlight>
                             <a:latin typeface="Cambria Math" panose="02040503050406030204" pitchFamily="18" charset="0"/>
                             <a:cs typeface="Times New Roman" panose="02020603050405020304" pitchFamily="18" charset="0"/>
                           </a:rPr>
@@ -14547,6 +14395,9 @@
                     </m:acc>
                     <m:r>
                       <a:rPr lang="fr-FR" i="1" dirty="0">
+                        <a:highlight>
+                          <a:srgbClr val="FFFF00"/>
+                        </a:highlight>
                         <a:latin typeface="Cambria Math" panose="02040503050406030204" pitchFamily="18" charset="0"/>
                         <a:cs typeface="Times New Roman" panose="02020603050405020304" pitchFamily="18" charset="0"/>
                       </a:rPr>
@@ -14556,6 +14407,9 @@
                 </a14:m>
                 <a:r>
                   <a:rPr lang="fr-FR" dirty="0">
+                    <a:highlight>
+                      <a:srgbClr val="FFFF00"/>
+                    </a:highlight>
                     <a:latin typeface="Times New Roman" panose="02020603050405020304" pitchFamily="18" charset="0"/>
                     <a:cs typeface="Times New Roman" panose="02020603050405020304" pitchFamily="18" charset="0"/>
                   </a:rPr>
@@ -14567,6 +14421,9 @@
                       <m:sSubPr>
                         <m:ctrlPr>
                           <a:rPr lang="fr-FR" b="0" i="1" dirty="0" smtClean="0">
+                            <a:highlight>
+                              <a:srgbClr val="FFFF00"/>
+                            </a:highlight>
                             <a:latin typeface="Cambria Math" panose="02040503050406030204" pitchFamily="18" charset="0"/>
                             <a:cs typeface="Times New Roman" panose="02020603050405020304" pitchFamily="18" charset="0"/>
                           </a:rPr>
@@ -14575,6 +14432,9 @@
                       <m:e>
                         <m:r>
                           <a:rPr lang="fr-FR" i="1" dirty="0" smtClean="0">
+                            <a:highlight>
+                              <a:srgbClr val="FFFF00"/>
+                            </a:highlight>
                             <a:latin typeface="Cambria Math" panose="02040503050406030204" pitchFamily="18" charset="0"/>
                             <a:cs typeface="Times New Roman" panose="02020603050405020304" pitchFamily="18" charset="0"/>
                           </a:rPr>
@@ -14584,6 +14444,9 @@
                       <m:sub>
                         <m:r>
                           <a:rPr lang="fr-FR" i="1" dirty="0" smtClean="0">
+                            <a:highlight>
+                              <a:srgbClr val="FFFF00"/>
+                            </a:highlight>
                             <a:latin typeface="Cambria Math" panose="02040503050406030204" pitchFamily="18" charset="0"/>
                             <a:cs typeface="Times New Roman" panose="02020603050405020304" pitchFamily="18" charset="0"/>
                           </a:rPr>
@@ -14593,6 +14456,9 @@
                     </m:sSub>
                     <m:r>
                       <a:rPr lang="fr-FR" i="1" dirty="0" smtClean="0">
+                        <a:highlight>
+                          <a:srgbClr val="FFFF00"/>
+                        </a:highlight>
                         <a:latin typeface="Cambria Math" panose="02040503050406030204" pitchFamily="18" charset="0"/>
                         <a:cs typeface="Times New Roman" panose="02020603050405020304" pitchFamily="18" charset="0"/>
                       </a:rPr>
@@ -14602,18 +14468,14 @@
                 </a14:m>
                 <a:r>
                   <a:rPr lang="fr-FR" dirty="0">
+                    <a:highlight>
+                      <a:srgbClr val="FFFF00"/>
+                    </a:highlight>
                     <a:latin typeface="Times New Roman" panose="02020603050405020304" pitchFamily="18" charset="0"/>
                     <a:cs typeface="Times New Roman" panose="02020603050405020304" pitchFamily="18" charset="0"/>
                   </a:rPr>
                   <a:t>. Cela confirme la cohérence des résultats, malgré de légères fluctuations observées pour les maillages fins.</a:t>
                 </a:r>
-                <a:endParaRPr lang="fr-FR" dirty="0">
-                  <a:highlight>
-                    <a:srgbClr val="FFFF00"/>
-                  </a:highlight>
-                  <a:latin typeface="Times New Roman" panose="02020603050405020304" pitchFamily="18" charset="0"/>
-                  <a:cs typeface="Times New Roman" panose="02020603050405020304" pitchFamily="18" charset="0"/>
-                </a:endParaRPr>
               </a:p>
             </p:txBody>
           </p:sp>
@@ -14644,7 +14506,7 @@
               <a:blipFill>
                 <a:blip r:embed="rId5"/>
                 <a:stretch>
-                  <a:fillRect l="-400" t="-4545" r="-400" b="-13636"/>
+                  <a:fillRect l="-400" t="-4545" r="-850" b="-13636"/>
                 </a:stretch>
               </a:blipFill>
             </p:spPr>
@@ -14663,6 +14525,35 @@
           </p:sp>
         </mc:Fallback>
       </mc:AlternateContent>
+      <p:sp>
+        <p:nvSpPr>
+          <p:cNvPr id="2" name="Slide Number Placeholder 1">
+            <a:extLst>
+              <a:ext uri="{FF2B5EF4-FFF2-40B4-BE49-F238E27FC236}">
+                <a16:creationId xmlns:a16="http://schemas.microsoft.com/office/drawing/2014/main" id="{A65EA5A6-181F-2CA0-D547-43725CE9B62F}"/>
+              </a:ext>
+            </a:extLst>
+          </p:cNvPr>
+          <p:cNvSpPr>
+            <a:spLocks noGrp="1"/>
+          </p:cNvSpPr>
+          <p:nvPr>
+            <p:ph type="sldNum" sz="quarter" idx="12"/>
+          </p:nvPr>
+        </p:nvSpPr>
+        <p:spPr/>
+        <p:txBody>
+          <a:bodyPr/>
+          <a:lstStyle/>
+          <a:p>
+            <a:fld id="{74DDA11D-2719-4AB3-AAA7-DB2910A56E08}" type="slidenum">
+              <a:rPr lang="en-GB" smtClean="0"/>
+              <a:t>4</a:t>
+            </a:fld>
+            <a:endParaRPr lang="en-GB" dirty="0"/>
+          </a:p>
+        </p:txBody>
+      </p:sp>
     </p:spTree>
     <p:extLst>
       <p:ext uri="{BB962C8B-B14F-4D97-AF65-F5344CB8AC3E}">
@@ -14842,52 +14733,6 @@
           <a:p>
             <a:pPr algn="ctr"/>
             <a:endParaRPr lang="fr-FR" noProof="0" dirty="0"/>
-          </a:p>
-        </p:txBody>
-      </p:sp>
-      <p:sp>
-        <p:nvSpPr>
-          <p:cNvPr id="47" name="TextBox 46">
-            <a:extLst>
-              <a:ext uri="{FF2B5EF4-FFF2-40B4-BE49-F238E27FC236}">
-                <a16:creationId xmlns:a16="http://schemas.microsoft.com/office/drawing/2014/main" id="{50D4B41C-B1EE-EEFD-9A94-70A58BB6143F}"/>
-              </a:ext>
-            </a:extLst>
-          </p:cNvPr>
-          <p:cNvSpPr txBox="1"/>
-          <p:nvPr/>
-        </p:nvSpPr>
-        <p:spPr>
-          <a:xfrm>
-            <a:off x="11091333" y="6550222"/>
-            <a:ext cx="1100667" cy="307777"/>
-          </a:xfrm>
-          <a:prstGeom prst="rect">
-            <a:avLst/>
-          </a:prstGeom>
-          <a:noFill/>
-        </p:spPr>
-        <p:txBody>
-          <a:bodyPr wrap="square" rtlCol="0">
-            <a:spAutoFit/>
-          </a:bodyPr>
-          <a:lstStyle/>
-          <a:p>
-            <a:pPr algn="r"/>
-            <a:r>
-              <a:rPr lang="fr-FR" sz="1400" dirty="0">
-                <a:latin typeface="Times New Roman" panose="02020603050405020304" pitchFamily="18" charset="0"/>
-                <a:cs typeface="Times New Roman" panose="02020603050405020304" pitchFamily="18" charset="0"/>
-              </a:rPr>
-              <a:t>1</a:t>
-            </a:r>
-            <a:r>
-              <a:rPr lang="fr-FR" sz="1400" noProof="0" dirty="0">
-                <a:latin typeface="Times New Roman" panose="02020603050405020304" pitchFamily="18" charset="0"/>
-                <a:cs typeface="Times New Roman" panose="02020603050405020304" pitchFamily="18" charset="0"/>
-              </a:rPr>
-              <a:t>/10</a:t>
-            </a:r>
           </a:p>
         </p:txBody>
       </p:sp>
@@ -16049,6 +15894,35 @@
           </a:p>
         </p:txBody>
       </p:sp>
+      <p:sp>
+        <p:nvSpPr>
+          <p:cNvPr id="2" name="Slide Number Placeholder 1">
+            <a:extLst>
+              <a:ext uri="{FF2B5EF4-FFF2-40B4-BE49-F238E27FC236}">
+                <a16:creationId xmlns:a16="http://schemas.microsoft.com/office/drawing/2014/main" id="{40AB6FBD-1D13-88E4-6251-9DF1B04FFA69}"/>
+              </a:ext>
+            </a:extLst>
+          </p:cNvPr>
+          <p:cNvSpPr>
+            <a:spLocks noGrp="1"/>
+          </p:cNvSpPr>
+          <p:nvPr>
+            <p:ph type="sldNum" sz="quarter" idx="12"/>
+          </p:nvPr>
+        </p:nvSpPr>
+        <p:spPr/>
+        <p:txBody>
+          <a:bodyPr/>
+          <a:lstStyle/>
+          <a:p>
+            <a:fld id="{74DDA11D-2719-4AB3-AAA7-DB2910A56E08}" type="slidenum">
+              <a:rPr lang="en-GB" smtClean="0"/>
+              <a:t>5</a:t>
+            </a:fld>
+            <a:endParaRPr lang="en-GB" dirty="0"/>
+          </a:p>
+        </p:txBody>
+      </p:sp>
     </p:spTree>
     <p:extLst>
       <p:ext uri="{BB962C8B-B14F-4D97-AF65-F5344CB8AC3E}">
@@ -16228,52 +16102,6 @@
           <a:p>
             <a:pPr algn="ctr"/>
             <a:endParaRPr lang="fr-FR" noProof="0" dirty="0"/>
-          </a:p>
-        </p:txBody>
-      </p:sp>
-      <p:sp>
-        <p:nvSpPr>
-          <p:cNvPr id="47" name="TextBox 46">
-            <a:extLst>
-              <a:ext uri="{FF2B5EF4-FFF2-40B4-BE49-F238E27FC236}">
-                <a16:creationId xmlns:a16="http://schemas.microsoft.com/office/drawing/2014/main" id="{6BF1353B-5DF7-3871-5843-37C5703927FD}"/>
-              </a:ext>
-            </a:extLst>
-          </p:cNvPr>
-          <p:cNvSpPr txBox="1"/>
-          <p:nvPr/>
-        </p:nvSpPr>
-        <p:spPr>
-          <a:xfrm>
-            <a:off x="11091333" y="6550222"/>
-            <a:ext cx="1100667" cy="307777"/>
-          </a:xfrm>
-          <a:prstGeom prst="rect">
-            <a:avLst/>
-          </a:prstGeom>
-          <a:noFill/>
-        </p:spPr>
-        <p:txBody>
-          <a:bodyPr wrap="square" rtlCol="0">
-            <a:spAutoFit/>
-          </a:bodyPr>
-          <a:lstStyle/>
-          <a:p>
-            <a:pPr algn="r"/>
-            <a:r>
-              <a:rPr lang="fr-FR" sz="1400" dirty="0">
-                <a:latin typeface="Times New Roman" panose="02020603050405020304" pitchFamily="18" charset="0"/>
-                <a:cs typeface="Times New Roman" panose="02020603050405020304" pitchFamily="18" charset="0"/>
-              </a:rPr>
-              <a:t>1</a:t>
-            </a:r>
-            <a:r>
-              <a:rPr lang="fr-FR" sz="1400" noProof="0" dirty="0">
-                <a:latin typeface="Times New Roman" panose="02020603050405020304" pitchFamily="18" charset="0"/>
-                <a:cs typeface="Times New Roman" panose="02020603050405020304" pitchFamily="18" charset="0"/>
-              </a:rPr>
-              <a:t>/10</a:t>
-            </a:r>
           </a:p>
         </p:txBody>
       </p:sp>
@@ -17485,6 +17313,35 @@
           </a:p>
         </p:txBody>
       </p:sp>
+      <p:sp>
+        <p:nvSpPr>
+          <p:cNvPr id="2" name="Slide Number Placeholder 1">
+            <a:extLst>
+              <a:ext uri="{FF2B5EF4-FFF2-40B4-BE49-F238E27FC236}">
+                <a16:creationId xmlns:a16="http://schemas.microsoft.com/office/drawing/2014/main" id="{309F3571-0937-68D0-30BA-0298C8B42753}"/>
+              </a:ext>
+            </a:extLst>
+          </p:cNvPr>
+          <p:cNvSpPr>
+            <a:spLocks noGrp="1"/>
+          </p:cNvSpPr>
+          <p:nvPr>
+            <p:ph type="sldNum" sz="quarter" idx="12"/>
+          </p:nvPr>
+        </p:nvSpPr>
+        <p:spPr/>
+        <p:txBody>
+          <a:bodyPr/>
+          <a:lstStyle/>
+          <a:p>
+            <a:fld id="{74DDA11D-2719-4AB3-AAA7-DB2910A56E08}" type="slidenum">
+              <a:rPr lang="en-GB" smtClean="0"/>
+              <a:t>6</a:t>
+            </a:fld>
+            <a:endParaRPr lang="en-GB" dirty="0"/>
+          </a:p>
+        </p:txBody>
+      </p:sp>
     </p:spTree>
     <p:extLst>
       <p:ext uri="{BB962C8B-B14F-4D97-AF65-F5344CB8AC3E}">
@@ -17521,6 +17378,83 @@
           <a:chExt cx="0" cy="0"/>
         </a:xfrm>
       </p:grpSpPr>
+      <p:sp>
+        <p:nvSpPr>
+          <p:cNvPr id="7" name="TextBox 6">
+            <a:extLst>
+              <a:ext uri="{FF2B5EF4-FFF2-40B4-BE49-F238E27FC236}">
+                <a16:creationId xmlns:a16="http://schemas.microsoft.com/office/drawing/2014/main" id="{9BCB23DC-A2F1-CB6B-0609-7DD98302BCD0}"/>
+              </a:ext>
+            </a:extLst>
+          </p:cNvPr>
+          <p:cNvSpPr txBox="1"/>
+          <p:nvPr/>
+        </p:nvSpPr>
+        <p:spPr>
+          <a:xfrm>
+            <a:off x="0" y="5713818"/>
+            <a:ext cx="12192000" cy="1200329"/>
+          </a:xfrm>
+          <a:prstGeom prst="rect">
+            <a:avLst/>
+          </a:prstGeom>
+          <a:noFill/>
+        </p:spPr>
+        <p:txBody>
+          <a:bodyPr wrap="square" rtlCol="0">
+            <a:spAutoFit/>
+          </a:bodyPr>
+          <a:lstStyle/>
+          <a:p>
+            <a:pPr algn="just"/>
+            <a:r>
+              <a:rPr lang="fr-FR" b="1" dirty="0">
+                <a:latin typeface="Times New Roman" panose="02020603050405020304" pitchFamily="18" charset="0"/>
+                <a:cs typeface="Times New Roman" panose="02020603050405020304" pitchFamily="18" charset="0"/>
+              </a:rPr>
+              <a:t>Remarque</a:t>
+            </a:r>
+            <a:r>
+              <a:rPr lang="fr-FR" dirty="0">
+                <a:latin typeface="Times New Roman" panose="02020603050405020304" pitchFamily="18" charset="0"/>
+                <a:cs typeface="Times New Roman" panose="02020603050405020304" pitchFamily="18" charset="0"/>
+              </a:rPr>
+              <a:t> : Etant donné que nous avons pris un grand nombre de couple, nous obtenons des courbes lisses pour la PDF et la CDF.</a:t>
+            </a:r>
+          </a:p>
+          <a:p>
+            <a:pPr algn="just"/>
+            <a:endParaRPr lang="fr-FR" dirty="0">
+              <a:latin typeface="Times New Roman" panose="02020603050405020304" pitchFamily="18" charset="0"/>
+              <a:cs typeface="Times New Roman" panose="02020603050405020304" pitchFamily="18" charset="0"/>
+            </a:endParaRPr>
+          </a:p>
+          <a:p>
+            <a:pPr algn="just"/>
+            <a:r>
+              <a:rPr lang="fr-FR" dirty="0">
+                <a:latin typeface="Times New Roman" panose="02020603050405020304" pitchFamily="18" charset="0"/>
+                <a:cs typeface="Times New Roman" panose="02020603050405020304" pitchFamily="18" charset="0"/>
+              </a:rPr>
+              <a:t>Nous remarquons en effet que la PDF décrit plus une </a:t>
+            </a:r>
+            <a:r>
+              <a:rPr lang="fr-FR" b="1" dirty="0">
+                <a:latin typeface="Times New Roman" panose="02020603050405020304" pitchFamily="18" charset="0"/>
+                <a:cs typeface="Times New Roman" panose="02020603050405020304" pitchFamily="18" charset="0"/>
+              </a:rPr>
+              <a:t>loi log-normal </a:t>
+            </a:r>
+            <a:r>
+              <a:rPr lang="fr-FR" dirty="0">
+                <a:latin typeface="Times New Roman" panose="02020603050405020304" pitchFamily="18" charset="0"/>
+                <a:cs typeface="Times New Roman" panose="02020603050405020304" pitchFamily="18" charset="0"/>
+              </a:rPr>
+              <a:t>plutôt qu’une gaussienne, comme indiqué par le sujet. En effet, on note ici l’asymétrie de la courbe.    </a:t>
+            </a:r>
+          </a:p>
+        </p:txBody>
+      </p:sp>
       <p:sp>
         <p:nvSpPr>
           <p:cNvPr id="36" name="Rectangle 35">
@@ -17667,52 +17601,6 @@
           </a:p>
         </p:txBody>
       </p:sp>
-      <p:sp>
-        <p:nvSpPr>
-          <p:cNvPr id="47" name="TextBox 46">
-            <a:extLst>
-              <a:ext uri="{FF2B5EF4-FFF2-40B4-BE49-F238E27FC236}">
-                <a16:creationId xmlns:a16="http://schemas.microsoft.com/office/drawing/2014/main" id="{522DB3F2-549C-8827-1FDA-D6B0B664F953}"/>
-              </a:ext>
-            </a:extLst>
-          </p:cNvPr>
-          <p:cNvSpPr txBox="1"/>
-          <p:nvPr/>
-        </p:nvSpPr>
-        <p:spPr>
-          <a:xfrm>
-            <a:off x="11091333" y="6550222"/>
-            <a:ext cx="1100667" cy="307777"/>
-          </a:xfrm>
-          <a:prstGeom prst="rect">
-            <a:avLst/>
-          </a:prstGeom>
-          <a:noFill/>
-        </p:spPr>
-        <p:txBody>
-          <a:bodyPr wrap="square" rtlCol="0">
-            <a:spAutoFit/>
-          </a:bodyPr>
-          <a:lstStyle/>
-          <a:p>
-            <a:pPr algn="r"/>
-            <a:r>
-              <a:rPr lang="fr-FR" sz="1400" dirty="0">
-                <a:latin typeface="Times New Roman" panose="02020603050405020304" pitchFamily="18" charset="0"/>
-                <a:cs typeface="Times New Roman" panose="02020603050405020304" pitchFamily="18" charset="0"/>
-              </a:rPr>
-              <a:t>1</a:t>
-            </a:r>
-            <a:r>
-              <a:rPr lang="fr-FR" sz="1400" noProof="0" dirty="0">
-                <a:latin typeface="Times New Roman" panose="02020603050405020304" pitchFamily="18" charset="0"/>
-                <a:cs typeface="Times New Roman" panose="02020603050405020304" pitchFamily="18" charset="0"/>
-              </a:rPr>
-              <a:t>/10</a:t>
-            </a:r>
-          </a:p>
-        </p:txBody>
-      </p:sp>
       <mc:AlternateContent xmlns:mc="http://schemas.openxmlformats.org/markup-compatibility/2006" xmlns:a14="http://schemas.microsoft.com/office/drawing/2010/main">
         <mc:Choice Requires="a14">
           <p:sp>
@@ -17877,14 +17765,7 @@
                         <a:latin typeface="Cambria Math" panose="02040503050406030204" pitchFamily="18" charset="0"/>
                         <a:cs typeface="Times New Roman" panose="02020603050405020304" pitchFamily="18" charset="0"/>
                       </a:rPr>
-                      <m:t>=</m:t>
-                    </m:r>
-                    <m:r>
-                      <a:rPr lang="fr-FR" i="1">
-                        <a:latin typeface="Cambria Math" panose="02040503050406030204" pitchFamily="18" charset="0"/>
-                        <a:cs typeface="Times New Roman" panose="02020603050405020304" pitchFamily="18" charset="0"/>
-                      </a:rPr>
-                      <m:t>200</m:t>
+                      <m:t>=200</m:t>
                     </m:r>
                   </m:oMath>
                 </a14:m>
@@ -18151,78 +18032,30 @@
       </p:pic>
       <p:sp>
         <p:nvSpPr>
-          <p:cNvPr id="7" name="TextBox 6">
+          <p:cNvPr id="3" name="Slide Number Placeholder 2">
             <a:extLst>
               <a:ext uri="{FF2B5EF4-FFF2-40B4-BE49-F238E27FC236}">
-                <a16:creationId xmlns:a16="http://schemas.microsoft.com/office/drawing/2014/main" id="{9BCB23DC-A2F1-CB6B-0609-7DD98302BCD0}"/>
+                <a16:creationId xmlns:a16="http://schemas.microsoft.com/office/drawing/2014/main" id="{0EF744EF-9AF8-7B52-EE88-01F45563D129}"/>
               </a:ext>
             </a:extLst>
           </p:cNvPr>
-          <p:cNvSpPr txBox="1"/>
-          <p:nvPr/>
+          <p:cNvSpPr>
+            <a:spLocks noGrp="1"/>
+          </p:cNvSpPr>
+          <p:nvPr>
+            <p:ph type="sldNum" sz="quarter" idx="12"/>
+          </p:nvPr>
         </p:nvSpPr>
-        <p:spPr>
-          <a:xfrm>
-            <a:off x="0" y="5713818"/>
-            <a:ext cx="12192000" cy="1200329"/>
-          </a:xfrm>
-          <a:prstGeom prst="rect">
-            <a:avLst/>
-          </a:prstGeom>
-          <a:noFill/>
-        </p:spPr>
+        <p:spPr/>
         <p:txBody>
-          <a:bodyPr wrap="square" rtlCol="0">
-            <a:spAutoFit/>
-          </a:bodyPr>
+          <a:bodyPr/>
           <a:lstStyle/>
           <a:p>
-            <a:pPr algn="just"/>
-            <a:r>
-              <a:rPr lang="fr-FR" b="1" dirty="0">
-                <a:latin typeface="Times New Roman" panose="02020603050405020304" pitchFamily="18" charset="0"/>
-                <a:cs typeface="Times New Roman" panose="02020603050405020304" pitchFamily="18" charset="0"/>
-              </a:rPr>
-              <a:t>Remarque</a:t>
-            </a:r>
-            <a:r>
-              <a:rPr lang="fr-FR" dirty="0">
-                <a:latin typeface="Times New Roman" panose="02020603050405020304" pitchFamily="18" charset="0"/>
-                <a:cs typeface="Times New Roman" panose="02020603050405020304" pitchFamily="18" charset="0"/>
-              </a:rPr>
-              <a:t> : Etant donné que nous avons pris un grand nombre de couple, nous obtenons des courbes lisses pour la PDF et la CDF.</a:t>
-            </a:r>
-          </a:p>
-          <a:p>
-            <a:pPr algn="just"/>
-            <a:endParaRPr lang="fr-FR" dirty="0">
-              <a:latin typeface="Times New Roman" panose="02020603050405020304" pitchFamily="18" charset="0"/>
-              <a:cs typeface="Times New Roman" panose="02020603050405020304" pitchFamily="18" charset="0"/>
-            </a:endParaRPr>
-          </a:p>
-          <a:p>
-            <a:pPr algn="just"/>
-            <a:r>
-              <a:rPr lang="fr-FR" dirty="0">
-                <a:latin typeface="Times New Roman" panose="02020603050405020304" pitchFamily="18" charset="0"/>
-                <a:cs typeface="Times New Roman" panose="02020603050405020304" pitchFamily="18" charset="0"/>
-              </a:rPr>
-              <a:t>Nous remarquons en effet que la PDF décrit plus une </a:t>
-            </a:r>
-            <a:r>
-              <a:rPr lang="fr-FR" b="1" dirty="0">
-                <a:latin typeface="Times New Roman" panose="02020603050405020304" pitchFamily="18" charset="0"/>
-                <a:cs typeface="Times New Roman" panose="02020603050405020304" pitchFamily="18" charset="0"/>
-              </a:rPr>
-              <a:t>loi log-normal </a:t>
-            </a:r>
-            <a:r>
-              <a:rPr lang="fr-FR" dirty="0">
-                <a:latin typeface="Times New Roman" panose="02020603050405020304" pitchFamily="18" charset="0"/>
-                <a:cs typeface="Times New Roman" panose="02020603050405020304" pitchFamily="18" charset="0"/>
-              </a:rPr>
-              <a:t>plutôt qu’une gaussienne, comme indiqué par le sujet. En effet, on note ici l’asymétrie de la courbe.    </a:t>
-            </a:r>
+            <a:fld id="{74DDA11D-2719-4AB3-AAA7-DB2910A56E08}" type="slidenum">
+              <a:rPr lang="en-GB" smtClean="0"/>
+              <a:t>7</a:t>
+            </a:fld>
+            <a:endParaRPr lang="en-GB" dirty="0"/>
           </a:p>
         </p:txBody>
       </p:sp>
@@ -18405,52 +18238,6 @@
           <a:p>
             <a:pPr algn="ctr"/>
             <a:endParaRPr lang="fr-FR" noProof="0" dirty="0"/>
-          </a:p>
-        </p:txBody>
-      </p:sp>
-      <p:sp>
-        <p:nvSpPr>
-          <p:cNvPr id="47" name="TextBox 46">
-            <a:extLst>
-              <a:ext uri="{FF2B5EF4-FFF2-40B4-BE49-F238E27FC236}">
-                <a16:creationId xmlns:a16="http://schemas.microsoft.com/office/drawing/2014/main" id="{6E166E6B-7EE3-EC34-BAE0-05C81EEE5F8A}"/>
-              </a:ext>
-            </a:extLst>
-          </p:cNvPr>
-          <p:cNvSpPr txBox="1"/>
-          <p:nvPr/>
-        </p:nvSpPr>
-        <p:spPr>
-          <a:xfrm>
-            <a:off x="11091333" y="6550222"/>
-            <a:ext cx="1100667" cy="307777"/>
-          </a:xfrm>
-          <a:prstGeom prst="rect">
-            <a:avLst/>
-          </a:prstGeom>
-          <a:noFill/>
-        </p:spPr>
-        <p:txBody>
-          <a:bodyPr wrap="square" rtlCol="0">
-            <a:spAutoFit/>
-          </a:bodyPr>
-          <a:lstStyle/>
-          <a:p>
-            <a:pPr algn="r"/>
-            <a:r>
-              <a:rPr lang="fr-FR" sz="1400" dirty="0">
-                <a:latin typeface="Times New Roman" panose="02020603050405020304" pitchFamily="18" charset="0"/>
-                <a:cs typeface="Times New Roman" panose="02020603050405020304" pitchFamily="18" charset="0"/>
-              </a:rPr>
-              <a:t>1</a:t>
-            </a:r>
-            <a:r>
-              <a:rPr lang="fr-FR" sz="1400" noProof="0" dirty="0">
-                <a:latin typeface="Times New Roman" panose="02020603050405020304" pitchFamily="18" charset="0"/>
-                <a:cs typeface="Times New Roman" panose="02020603050405020304" pitchFamily="18" charset="0"/>
-              </a:rPr>
-              <a:t>/10</a:t>
-            </a:r>
           </a:p>
         </p:txBody>
       </p:sp>
@@ -19425,7 +19212,7 @@
               <a:blipFill>
                 <a:blip r:embed="rId2"/>
                 <a:stretch>
-                  <a:fillRect l="-400" t="-713" r="-850"/>
+                  <a:fillRect l="-400" t="-713" r="-400"/>
                 </a:stretch>
               </a:blipFill>
             </p:spPr>
@@ -19545,6 +19332,35 @@
               <a:latin typeface="Times New Roman" panose="02020603050405020304" pitchFamily="18" charset="0"/>
               <a:cs typeface="Times New Roman" panose="02020603050405020304" pitchFamily="18" charset="0"/>
             </a:endParaRPr>
+          </a:p>
+        </p:txBody>
+      </p:sp>
+      <p:sp>
+        <p:nvSpPr>
+          <p:cNvPr id="4" name="Slide Number Placeholder 3">
+            <a:extLst>
+              <a:ext uri="{FF2B5EF4-FFF2-40B4-BE49-F238E27FC236}">
+                <a16:creationId xmlns:a16="http://schemas.microsoft.com/office/drawing/2014/main" id="{060ADA90-5964-7164-22AE-A8BD81DDE003}"/>
+              </a:ext>
+            </a:extLst>
+          </p:cNvPr>
+          <p:cNvSpPr>
+            <a:spLocks noGrp="1"/>
+          </p:cNvSpPr>
+          <p:nvPr>
+            <p:ph type="sldNum" sz="quarter" idx="12"/>
+          </p:nvPr>
+        </p:nvSpPr>
+        <p:spPr/>
+        <p:txBody>
+          <a:bodyPr/>
+          <a:lstStyle/>
+          <a:p>
+            <a:fld id="{74DDA11D-2719-4AB3-AAA7-DB2910A56E08}" type="slidenum">
+              <a:rPr lang="en-GB" smtClean="0"/>
+              <a:t>8</a:t>
+            </a:fld>
+            <a:endParaRPr lang="en-GB" dirty="0"/>
           </a:p>
         </p:txBody>
       </p:sp>
@@ -19730,52 +19546,6 @@
           </a:p>
         </p:txBody>
       </p:sp>
-      <p:sp>
-        <p:nvSpPr>
-          <p:cNvPr id="47" name="TextBox 46">
-            <a:extLst>
-              <a:ext uri="{FF2B5EF4-FFF2-40B4-BE49-F238E27FC236}">
-                <a16:creationId xmlns:a16="http://schemas.microsoft.com/office/drawing/2014/main" id="{D8A9A844-34EC-4A9D-BB49-825AE39CF03F}"/>
-              </a:ext>
-            </a:extLst>
-          </p:cNvPr>
-          <p:cNvSpPr txBox="1"/>
-          <p:nvPr/>
-        </p:nvSpPr>
-        <p:spPr>
-          <a:xfrm>
-            <a:off x="11091333" y="6550222"/>
-            <a:ext cx="1100667" cy="307777"/>
-          </a:xfrm>
-          <a:prstGeom prst="rect">
-            <a:avLst/>
-          </a:prstGeom>
-          <a:noFill/>
-        </p:spPr>
-        <p:txBody>
-          <a:bodyPr wrap="square" rtlCol="0">
-            <a:spAutoFit/>
-          </a:bodyPr>
-          <a:lstStyle/>
-          <a:p>
-            <a:pPr algn="r"/>
-            <a:r>
-              <a:rPr lang="fr-FR" sz="1400" dirty="0">
-                <a:latin typeface="Times New Roman" panose="02020603050405020304" pitchFamily="18" charset="0"/>
-                <a:cs typeface="Times New Roman" panose="02020603050405020304" pitchFamily="18" charset="0"/>
-              </a:rPr>
-              <a:t>1</a:t>
-            </a:r>
-            <a:r>
-              <a:rPr lang="fr-FR" sz="1400" noProof="0" dirty="0">
-                <a:latin typeface="Times New Roman" panose="02020603050405020304" pitchFamily="18" charset="0"/>
-                <a:cs typeface="Times New Roman" panose="02020603050405020304" pitchFamily="18" charset="0"/>
-              </a:rPr>
-              <a:t>/10</a:t>
-            </a:r>
-          </a:p>
-        </p:txBody>
-      </p:sp>
       <mc:AlternateContent xmlns:mc="http://schemas.openxmlformats.org/markup-compatibility/2006">
         <mc:Choice xmlns:a14="http://schemas.microsoft.com/office/drawing/2010/main" Requires="a14">
           <p:sp>
@@ -20229,6 +19999,35 @@
           </p:sp>
         </mc:Fallback>
       </mc:AlternateContent>
+      <p:sp>
+        <p:nvSpPr>
+          <p:cNvPr id="7" name="Slide Number Placeholder 6">
+            <a:extLst>
+              <a:ext uri="{FF2B5EF4-FFF2-40B4-BE49-F238E27FC236}">
+                <a16:creationId xmlns:a16="http://schemas.microsoft.com/office/drawing/2014/main" id="{E7905179-4BD3-A69B-44D3-7EEF75A38C02}"/>
+              </a:ext>
+            </a:extLst>
+          </p:cNvPr>
+          <p:cNvSpPr>
+            <a:spLocks noGrp="1"/>
+          </p:cNvSpPr>
+          <p:nvPr>
+            <p:ph type="sldNum" sz="quarter" idx="12"/>
+          </p:nvPr>
+        </p:nvSpPr>
+        <p:spPr/>
+        <p:txBody>
+          <a:bodyPr/>
+          <a:lstStyle/>
+          <a:p>
+            <a:fld id="{74DDA11D-2719-4AB3-AAA7-DB2910A56E08}" type="slidenum">
+              <a:rPr lang="en-GB" smtClean="0"/>
+              <a:t>9</a:t>
+            </a:fld>
+            <a:endParaRPr lang="en-GB" dirty="0"/>
+          </a:p>
+        </p:txBody>
+      </p:sp>
     </p:spTree>
     <p:extLst>
       <p:ext uri="{BB962C8B-B14F-4D97-AF65-F5344CB8AC3E}">

</xml_diff>